<commit_message>
Highlight reels generation and GDrive upload
</commit_message>
<xml_diff>
--- a/data/player_report.pptx
+++ b/data/player_report.pptx
@@ -23602,7 +23602,7 @@
             <a:pPr lvl="1"/>
             <a:r>
               <a:rPr lang="en-US" dirty="0"/>
-              <a:t>Your Serve Depth is 39.09 feet  from baseline (Beginner Level)</a:t>
+              <a:t>Your Serve Depth is 4.91 feet  from baseline (Intermediate Level)</a:t>
             </a:r>
           </a:p>
           <a:p>
@@ -23899,7 +23899,7 @@
             <a:pPr lvl="1"/>
             <a:r>
               <a:rPr lang="en-US" dirty="0"/>
-              <a:t>Your Return Depth is 35.00 Ft (Beginner Level)</a:t>
+              <a:t>Your Return Depth is 9.00 Ft (Beginner Level)</a:t>
             </a:r>
           </a:p>
           <a:p>
@@ -24332,7 +24332,7 @@
           <a:p>
             <a:r>
               <a:rPr lang="en-US" dirty="0"/>
-              <a:t>Serve Depth – Beginner Level</a:t>
+              <a:t>Serve Depth – Intermediate Level</a:t>
             </a:r>
           </a:p>
           <a:p>

</xml_diff>